<commit_message>
Add speaker profile to CLAUDE.md and update gas-intro slides
- Added detailed speaker profile section with ambassador activities, SNS, and usage guidelines per LT theme
- Updated self-intro slide with GAS-appropriate profile items

https://claude.ai/code/session_01KpgSaUYex3ru6h8C82HrQw
</commit_message>
<xml_diff>
--- a/downloads/pptx/gas-intro.pptx
+++ b/downloads/pptx/gas-intro.pptx
@@ -4273,7 +4273,7 @@
                 <a:ea typeface="Noto Sans JP" pitchFamily="34" charset="-122"/>
                 <a:cs typeface="Noto Sans JP" pitchFamily="34" charset="-120"/>
               </a:rPr>
-              <a:t>▶  エンジニア</a:t>
+              <a:t>▶  非エンジニア × AI × GASで業務改善！</a:t>
             </a:r>
             <a:endParaRPr lang="en-US" sz="1800" dirty="0"/>
           </a:p>
@@ -4315,7 +4315,7 @@
                 <a:ea typeface="Noto Sans JP" pitchFamily="34" charset="-122"/>
                 <a:cs typeface="Noto Sans JP" pitchFamily="34" charset="-120"/>
               </a:rPr>
-              <a:t>▶  GASで業務効率化を実践中</a:t>
+              <a:t>▶  Notion公式アンバサダー</a:t>
             </a:r>
             <a:endParaRPr lang="en-US" sz="1800" dirty="0"/>
           </a:p>
@@ -4357,7 +4357,7 @@
                 <a:ea typeface="Noto Sans JP" pitchFamily="34" charset="-122"/>
                 <a:cs typeface="Noto Sans JP" pitchFamily="34" charset="-120"/>
               </a:rPr>
-              <a:t>▶  好きな技術: JavaScript / Node.js</a:t>
+              <a:t>▶  Notionさいたま主宰 / DATASaber</a:t>
             </a:r>
             <a:endParaRPr lang="en-US" sz="1800" dirty="0"/>
           </a:p>
@@ -4399,7 +4399,7 @@
                 <a:ea typeface="Noto Sans JP" pitchFamily="34" charset="-122"/>
                 <a:cs typeface="Noto Sans JP" pitchFamily="34" charset="-120"/>
               </a:rPr>
-              <a:t>▶  暮らしをテクノロジーで豊かに</a:t>
+              <a:t>▶  X: @keitaro_aigc</a:t>
             </a:r>
             <a:endParaRPr lang="en-US" sz="1800" dirty="0"/>
           </a:p>

</xml_diff>